<commit_message>
CLIPS started, Script PL report done
</commit_message>
<xml_diff>
--- a/sem 7/Script PL/report/OOP Python.pptx
+++ b/sem 7/Script PL/report/OOP Python.pptx
@@ -3,7 +3,7 @@
 <p:presentation xmlns:a="http://schemas.openxmlformats.org/drawingml/2006/main" xmlns:p="http://schemas.openxmlformats.org/presentationml/2006/main" xmlns:r="http://schemas.openxmlformats.org/officeDocument/2006/relationships" xmlns:p14="http://schemas.microsoft.com/office/powerpoint/2010/main" xmlns:p15="http://schemas.microsoft.com/office/powerpoint/2012/main" xmlns:mc="http://schemas.openxmlformats.org/markup-compatibility/2006">
   <p:sldMasterIdLst>
     <p:sldMasterId id="2147483648" r:id="rId2"/>
-    <p:sldMasterId id="2147483650" r:id="rId3"/>
+    <p:sldMasterId id="2147483651" r:id="rId3"/>
   </p:sldMasterIdLst>
   <p:sldIdLst>
     <p:sldId id="256" r:id="rId4"/>
@@ -29,6 +29,171 @@
 </file>
 
 <file path=ppt/slideLayouts/slideLayout1.xml><?xml version="1.0" encoding="utf-8"?>
+<p:sldLayout xmlns:a="http://schemas.openxmlformats.org/drawingml/2006/main" xmlns:p="http://schemas.openxmlformats.org/presentationml/2006/main" xmlns:r="http://schemas.openxmlformats.org/officeDocument/2006/relationships" xmlns:p14="http://schemas.microsoft.com/office/powerpoint/2010/main" xmlns:p15="http://schemas.microsoft.com/office/powerpoint/2012/main" xmlns:mc="http://schemas.openxmlformats.org/markup-compatibility/2006" type="title" preserve="1">
+  <p:cSld name="Default">
+    <p:spTree>
+      <p:nvGrpSpPr>
+        <p:cNvPr id="1" name=""/>
+        <p:cNvGrpSpPr/>
+        <p:nvPr/>
+      </p:nvGrpSpPr>
+      <p:grpSpPr>
+        <a:xfrm>
+          <a:off x="0" y="0"/>
+          <a:ext cx="0" cy="0"/>
+          <a:chOff x="0" y="0"/>
+          <a:chExt cx="0" cy="0"/>
+        </a:xfrm>
+      </p:grpSpPr>
+      <p:sp>
+        <p:nvSpPr>
+          <p:cNvPr id="5" name="PlaceHolder 1"/>
+          <p:cNvSpPr>
+            <a:spLocks noGrp="1"/>
+          </p:cNvSpPr>
+          <p:nvPr>
+            <p:ph type="title"/>
+          </p:nvPr>
+        </p:nvSpPr>
+        <p:spPr>
+          <a:xfrm>
+            <a:off x="504000" y="226080"/>
+            <a:ext cx="9070560" cy="945360"/>
+          </a:xfrm>
+          <a:prstGeom prst="rect">
+            <a:avLst/>
+          </a:prstGeom>
+          <a:noFill/>
+          <a:ln w="0">
+            <a:noFill/>
+          </a:ln>
+        </p:spPr>
+        <p:txBody>
+          <a:bodyPr lIns="0" rIns="0" tIns="0" bIns="0" anchor="ctr">
+            <a:noAutofit/>
+          </a:bodyPr>
+          <a:p>
+            <a:pPr indent="0" algn="ctr">
+              <a:buNone/>
+            </a:pPr>
+            <a:endParaRPr b="0" lang="en-US" sz="4400" strike="noStrike" u="none">
+              <a:solidFill>
+                <a:srgbClr val="000000"/>
+              </a:solidFill>
+              <a:uFillTx/>
+              <a:latin typeface="Arial"/>
+            </a:endParaRPr>
+          </a:p>
+        </p:txBody>
+      </p:sp>
+      <p:sp>
+        <p:nvSpPr>
+          <p:cNvPr id="6" name="PlaceHolder 2"/>
+          <p:cNvSpPr>
+            <a:spLocks noGrp="1"/>
+          </p:cNvSpPr>
+          <p:nvPr>
+            <p:ph type="subTitle"/>
+          </p:nvPr>
+        </p:nvSpPr>
+        <p:spPr>
+          <a:xfrm>
+            <a:off x="504000" y="1326600"/>
+            <a:ext cx="9072000" cy="3288600"/>
+          </a:xfrm>
+          <a:prstGeom prst="rect">
+            <a:avLst/>
+          </a:prstGeom>
+          <a:noFill/>
+          <a:ln w="0">
+            <a:noFill/>
+          </a:ln>
+        </p:spPr>
+        <p:txBody>
+          <a:bodyPr lIns="0" rIns="0" tIns="0" bIns="0" anchor="ctr">
+            <a:noAutofit/>
+          </a:bodyPr>
+          <a:p>
+            <a:pPr indent="0" algn="ctr">
+              <a:buNone/>
+            </a:pPr>
+            <a:endParaRPr b="0" lang="en-US" sz="3200" strike="noStrike" u="none">
+              <a:solidFill>
+                <a:srgbClr val="000000"/>
+              </a:solidFill>
+              <a:uFillTx/>
+              <a:latin typeface="Arial"/>
+            </a:endParaRPr>
+          </a:p>
+        </p:txBody>
+      </p:sp>
+      <p:sp>
+        <p:nvSpPr>
+          <p:cNvPr id="4" name="PlaceHolder 3"/>
+          <p:cNvSpPr>
+            <a:spLocks noGrp="1"/>
+          </p:cNvSpPr>
+          <p:nvPr>
+            <p:ph type="ftr" idx="1"/>
+          </p:nvPr>
+        </p:nvSpPr>
+        <p:spPr/>
+        <p:txBody>
+          <a:bodyPr/>
+          <a:p>
+            <a:r>
+              <a:t>Footer</a:t>
+            </a:r>
+          </a:p>
+        </p:txBody>
+      </p:sp>
+      <p:sp>
+        <p:nvSpPr>
+          <p:cNvPr id="5" name="PlaceHolder 4"/>
+          <p:cNvSpPr>
+            <a:spLocks noGrp="1"/>
+          </p:cNvSpPr>
+          <p:nvPr>
+            <p:ph type="sldNum" idx="2"/>
+          </p:nvPr>
+        </p:nvSpPr>
+        <p:spPr/>
+        <p:txBody>
+          <a:bodyPr/>
+          <a:p>
+            <a:fld id="{39E1879B-5DEA-48B2-BCA6-F7B25C3D0E35}" type="slidenum">
+              <a:t>&lt;#&gt;</a:t>
+            </a:fld>
+          </a:p>
+        </p:txBody>
+      </p:sp>
+      <p:sp>
+        <p:nvSpPr>
+          <p:cNvPr id="6" name="PlaceHolder 5"/>
+          <p:cNvSpPr>
+            <a:spLocks noGrp="1"/>
+          </p:cNvSpPr>
+          <p:nvPr>
+            <p:ph type="dt" idx="3"/>
+          </p:nvPr>
+        </p:nvSpPr>
+        <p:spPr/>
+        <p:txBody>
+          <a:bodyPr/>
+          <a:p>
+            <a:r>
+              <a:rPr lang="en-US"/>
+              <a:t/>
+            </a:r>
+          </a:p>
+        </p:txBody>
+      </p:sp>
+    </p:spTree>
+  </p:cSld>
+</p:sldLayout>
+</file>
+
+<file path=ppt/slideLayouts/slideLayout2.xml><?xml version="1.0" encoding="utf-8"?>
 <p:sldLayout xmlns:a="http://schemas.openxmlformats.org/drawingml/2006/main" xmlns:p="http://schemas.openxmlformats.org/presentationml/2006/main" xmlns:r="http://schemas.openxmlformats.org/officeDocument/2006/relationships" xmlns:p14="http://schemas.microsoft.com/office/powerpoint/2010/main" xmlns:p15="http://schemas.microsoft.com/office/powerpoint/2012/main" xmlns:mc="http://schemas.openxmlformats.org/markup-compatibility/2006" type="titleOnly" preserve="1">
   <p:cSld name="Default">
     <p:spTree>
@@ -47,7 +212,7 @@
       </p:grpSpPr>
       <p:sp>
         <p:nvSpPr>
-          <p:cNvPr id="5" name="PlaceHolder 1"/>
+          <p:cNvPr id="7" name="PlaceHolder 1"/>
           <p:cNvSpPr>
             <a:spLocks noGrp="1"/>
           </p:cNvSpPr>
@@ -58,7 +223,7 @@
         <p:spPr>
           <a:xfrm>
             <a:off x="504000" y="226080"/>
-            <a:ext cx="9070920" cy="945720"/>
+            <a:ext cx="9070560" cy="945360"/>
           </a:xfrm>
           <a:prstGeom prst="rect">
             <a:avLst/>
@@ -120,7 +285,7 @@
         <p:txBody>
           <a:bodyPr/>
           <a:p>
-            <a:fld id="{383B15F4-2663-4B08-96EB-F51772CF0135}" type="slidenum">
+            <a:fld id="{C27A0B8F-915B-4DC8-84CF-73168453C976}" type="slidenum">
               <a:t>&lt;#&gt;</a:t>
             </a:fld>
           </a:p>
@@ -152,7 +317,7 @@
 </p:sldLayout>
 </file>
 
-<file path=ppt/slideLayouts/slideLayout2.xml><?xml version="1.0" encoding="utf-8"?>
+<file path=ppt/slideLayouts/slideLayout3.xml><?xml version="1.0" encoding="utf-8"?>
 <p:sldLayout xmlns:a="http://schemas.openxmlformats.org/drawingml/2006/main" xmlns:p="http://schemas.openxmlformats.org/presentationml/2006/main" xmlns:r="http://schemas.openxmlformats.org/officeDocument/2006/relationships" xmlns:p14="http://schemas.microsoft.com/office/powerpoint/2010/main" xmlns:p15="http://schemas.microsoft.com/office/powerpoint/2012/main" xmlns:mc="http://schemas.openxmlformats.org/markup-compatibility/2006" type="title" preserve="1">
   <p:cSld name="Default 1">
     <p:spTree>
@@ -171,7 +336,7 @@
       </p:grpSpPr>
       <p:sp>
         <p:nvSpPr>
-          <p:cNvPr id="11" name="PlaceHolder 1"/>
+          <p:cNvPr id="13" name="PlaceHolder 1"/>
           <p:cNvSpPr>
             <a:spLocks noGrp="1"/>
           </p:cNvSpPr>
@@ -182,7 +347,7 @@
         <p:spPr>
           <a:xfrm>
             <a:off x="504000" y="226080"/>
-            <a:ext cx="9070920" cy="945720"/>
+            <a:ext cx="9070560" cy="945360"/>
           </a:xfrm>
           <a:prstGeom prst="rect">
             <a:avLst/>
@@ -212,7 +377,7 @@
       </p:sp>
       <p:sp>
         <p:nvSpPr>
-          <p:cNvPr id="12" name="PlaceHolder 2"/>
+          <p:cNvPr id="14" name="PlaceHolder 2"/>
           <p:cNvSpPr>
             <a:spLocks noGrp="1"/>
           </p:cNvSpPr>
@@ -285,7 +450,7 @@
         <p:txBody>
           <a:bodyPr/>
           <a:p>
-            <a:fld id="{7C9D876A-EF74-4BEB-88A5-57008B73A1F7}" type="slidenum">
+            <a:fld id="{483122AC-18D7-44F1-B99E-58691500C093}" type="slidenum">
               <a:t>&lt;#&gt;</a:t>
             </a:fld>
           </a:p>
@@ -347,7 +512,7 @@
         <p:spPr>
           <a:xfrm>
             <a:off x="504000" y="226080"/>
-            <a:ext cx="9070920" cy="945720"/>
+            <a:ext cx="9070560" cy="945360"/>
           </a:xfrm>
           <a:prstGeom prst="rect">
             <a:avLst/>
@@ -398,7 +563,7 @@
         <p:spPr>
           <a:xfrm>
             <a:off x="3447360" y="5165280"/>
-            <a:ext cx="3194280" cy="389880"/>
+            <a:ext cx="3193920" cy="389520"/>
           </a:xfrm>
           <a:prstGeom prst="rect">
             <a:avLst/>
@@ -473,7 +638,7 @@
         <p:spPr>
           <a:xfrm>
             <a:off x="7227360" y="5165280"/>
-            <a:ext cx="2347560" cy="389880"/>
+            <a:ext cx="2347200" cy="389520"/>
           </a:xfrm>
           <a:prstGeom prst="rect">
             <a:avLst/>
@@ -515,7 +680,7 @@
                 <a:tab algn="l" pos="0"/>
               </a:tabLst>
             </a:pPr>
-            <a:fld id="{36C54D47-DA76-4126-92A0-3C1F5EE87626}" type="slidenum">
+            <a:fld id="{85E2B05B-1E8F-4A06-97C7-40525F31AD37}" type="slidenum">
               <a:rPr b="0" lang="en-US" sz="1400" strike="noStrike" u="none">
                 <a:solidFill>
                   <a:srgbClr val="000000"/>
@@ -548,7 +713,7 @@
         <p:spPr>
           <a:xfrm>
             <a:off x="504000" y="5165280"/>
-            <a:ext cx="2347560" cy="389880"/>
+            <a:ext cx="2347200" cy="389520"/>
           </a:xfrm>
           <a:prstGeom prst="rect">
             <a:avLst/>
@@ -842,6 +1007,7 @@
   <p:clrMap bg1="lt1" tx1="dk1" bg2="lt2" tx2="dk2" accent1="accent1" accent2="accent2" accent3="accent3" accent4="accent4" accent5="accent5" accent6="accent6" hlink="hlink" folHlink="folHlink"/>
   <p:sldLayoutIdLst>
     <p:sldLayoutId id="2147483649" r:id="rId2"/>
+    <p:sldLayoutId id="2147483650" r:id="rId3"/>
   </p:sldLayoutIdLst>
 </p:sldMaster>
 </file>
@@ -865,7 +1031,7 @@
       </p:grpSpPr>
       <p:sp>
         <p:nvSpPr>
-          <p:cNvPr id="6" name="PlaceHolder 1"/>
+          <p:cNvPr id="8" name="PlaceHolder 1"/>
           <p:cNvSpPr>
             <a:spLocks noGrp="1"/>
           </p:cNvSpPr>
@@ -876,7 +1042,7 @@
         <p:spPr>
           <a:xfrm>
             <a:off x="504000" y="226080"/>
-            <a:ext cx="9070920" cy="945720"/>
+            <a:ext cx="9070560" cy="945360"/>
           </a:xfrm>
           <a:prstGeom prst="rect">
             <a:avLst/>
@@ -916,7 +1082,7 @@
       </p:sp>
       <p:sp>
         <p:nvSpPr>
-          <p:cNvPr id="7" name="PlaceHolder 2"/>
+          <p:cNvPr id="9" name="PlaceHolder 2"/>
           <p:cNvSpPr>
             <a:spLocks noGrp="1"/>
           </p:cNvSpPr>
@@ -927,7 +1093,7 @@
         <p:spPr>
           <a:xfrm>
             <a:off x="3447360" y="5165280"/>
-            <a:ext cx="3194280" cy="389880"/>
+            <a:ext cx="3193920" cy="389520"/>
           </a:xfrm>
           <a:prstGeom prst="rect">
             <a:avLst/>
@@ -977,7 +1143,7 @@
                 <a:uFillTx/>
                 <a:latin typeface="Times New Roman"/>
               </a:rPr>
-              <a:t>&lt;footer&gt;</a:t>
+              <a:t> </a:t>
             </a:r>
             <a:endParaRPr b="0" lang="en-US" sz="1400" strike="noStrike" u="none">
               <a:solidFill>
@@ -991,7 +1157,7 @@
       </p:sp>
       <p:sp>
         <p:nvSpPr>
-          <p:cNvPr id="8" name="PlaceHolder 3"/>
+          <p:cNvPr id="10" name="PlaceHolder 3"/>
           <p:cNvSpPr>
             <a:spLocks noGrp="1"/>
           </p:cNvSpPr>
@@ -1002,7 +1168,7 @@
         <p:spPr>
           <a:xfrm>
             <a:off x="7227360" y="5165280"/>
-            <a:ext cx="2347560" cy="389880"/>
+            <a:ext cx="2347200" cy="389520"/>
           </a:xfrm>
           <a:prstGeom prst="rect">
             <a:avLst/>
@@ -1044,7 +1210,7 @@
                 <a:tab algn="l" pos="0"/>
               </a:tabLst>
             </a:pPr>
-            <a:fld id="{3FF89E8A-D446-4733-8C8B-1D9295162828}" type="slidenum">
+            <a:fld id="{1B6656A3-4220-46CB-84AF-28F414F4ABCE}" type="slidenum">
               <a:rPr b="0" lang="en-US" sz="1400" strike="noStrike" u="none">
                 <a:solidFill>
                   <a:srgbClr val="000000"/>
@@ -1052,7 +1218,7 @@
                 <a:uFillTx/>
                 <a:latin typeface="Times New Roman"/>
               </a:rPr>
-              <a:t>&lt;number&gt;</a:t>
+              <a:t>1</a:t>
             </a:fld>
             <a:endParaRPr b="0" lang="en-US" sz="1400" strike="noStrike" u="none">
               <a:solidFill>
@@ -1066,7 +1232,7 @@
       </p:sp>
       <p:sp>
         <p:nvSpPr>
-          <p:cNvPr id="9" name="PlaceHolder 4"/>
+          <p:cNvPr id="11" name="PlaceHolder 4"/>
           <p:cNvSpPr>
             <a:spLocks noGrp="1"/>
           </p:cNvSpPr>
@@ -1077,7 +1243,7 @@
         <p:spPr>
           <a:xfrm>
             <a:off x="504000" y="5165280"/>
-            <a:ext cx="2347560" cy="389880"/>
+            <a:ext cx="2347200" cy="389520"/>
           </a:xfrm>
           <a:prstGeom prst="rect">
             <a:avLst/>
@@ -1115,7 +1281,7 @@
                 <a:uFillTx/>
                 <a:latin typeface="Times New Roman"/>
               </a:rPr>
-              <a:t>&lt;date/time&gt;</a:t>
+              <a:t> </a:t>
             </a:r>
             <a:endParaRPr b="0" lang="en-US" sz="1400" strike="noStrike" u="none">
               <a:solidFill>
@@ -1129,7 +1295,7 @@
       </p:sp>
       <p:sp>
         <p:nvSpPr>
-          <p:cNvPr id="10" name="PlaceHolder 5"/>
+          <p:cNvPr id="12" name="PlaceHolder 5"/>
           <p:cNvSpPr>
             <a:spLocks noGrp="1"/>
           </p:cNvSpPr>
@@ -1370,7 +1536,7 @@
   </p:cSld>
   <p:clrMap bg1="lt1" tx1="dk1" bg2="lt2" tx2="dk2" accent1="accent1" accent2="accent2" accent3="accent3" accent4="accent4" accent5="accent5" accent6="accent6" hlink="hlink" folHlink="folHlink"/>
   <p:sldLayoutIdLst>
-    <p:sldLayoutId id="2147483651" r:id="rId2"/>
+    <p:sldLayoutId id="2147483652" r:id="rId2"/>
   </p:sldLayoutIdLst>
 </p:sldMaster>
 </file>
@@ -1394,7 +1560,7 @@
       </p:grpSpPr>
       <p:sp>
         <p:nvSpPr>
-          <p:cNvPr id="13" name="PlaceHolder 1"/>
+          <p:cNvPr id="15" name="PlaceHolder 1"/>
           <p:cNvSpPr>
             <a:spLocks noGrp="1"/>
           </p:cNvSpPr>
@@ -1405,7 +1571,7 @@
         <p:spPr>
           <a:xfrm>
             <a:off x="504000" y="226080"/>
-            <a:ext cx="9070920" cy="945720"/>
+            <a:ext cx="9070560" cy="945360"/>
           </a:xfrm>
           <a:prstGeom prst="rect">
             <a:avLst/>
@@ -1451,7 +1617,7 @@
       </p:sp>
       <p:sp>
         <p:nvSpPr>
-          <p:cNvPr id="14" name="PlaceHolder 2"/>
+          <p:cNvPr id="16" name="PlaceHolder 2"/>
           <p:cNvSpPr>
             <a:spLocks noGrp="1"/>
           </p:cNvSpPr>
@@ -1462,7 +1628,7 @@
         <p:spPr>
           <a:xfrm>
             <a:off x="504000" y="1828800"/>
-            <a:ext cx="9070920" cy="3287520"/>
+            <a:ext cx="9070560" cy="3287160"/>
           </a:xfrm>
           <a:prstGeom prst="rect">
             <a:avLst/>
@@ -1594,7 +1760,7 @@
       </p:grpSpPr>
       <p:sp>
         <p:nvSpPr>
-          <p:cNvPr id="33" name="PlaceHolder 1"/>
+          <p:cNvPr id="35" name="PlaceHolder 1"/>
           <p:cNvSpPr>
             <a:spLocks noGrp="1"/>
           </p:cNvSpPr>
@@ -1605,7 +1771,7 @@
         <p:spPr>
           <a:xfrm>
             <a:off x="504000" y="74160"/>
-            <a:ext cx="9070920" cy="1249920"/>
+            <a:ext cx="9070560" cy="1249560"/>
           </a:xfrm>
           <a:prstGeom prst="rect">
             <a:avLst/>
@@ -1651,7 +1817,7 @@
       </p:sp>
       <p:pic>
         <p:nvPicPr>
-          <p:cNvPr id="34" name="" descr=""/>
+          <p:cNvPr id="36" name="" descr=""/>
           <p:cNvPicPr/>
           <p:nvPr/>
         </p:nvPicPr>
@@ -1662,7 +1828,7 @@
         <p:spPr>
           <a:xfrm>
             <a:off x="228600" y="1324080"/>
-            <a:ext cx="5727960" cy="3705120"/>
+            <a:ext cx="5727600" cy="3704760"/>
           </a:xfrm>
           <a:prstGeom prst="rect">
             <a:avLst/>
@@ -1674,14 +1840,14 @@
       </p:pic>
       <p:sp>
         <p:nvSpPr>
-          <p:cNvPr id="35" name=""/>
-          <p:cNvSpPr txBox="1"/>
+          <p:cNvPr id="37" name=""/>
+          <p:cNvSpPr/>
           <p:nvPr/>
         </p:nvSpPr>
         <p:spPr>
           <a:xfrm>
             <a:off x="6400800" y="2286000"/>
-            <a:ext cx="3429000" cy="1915200"/>
+            <a:ext cx="3428640" cy="1914840"/>
           </a:xfrm>
           <a:prstGeom prst="rect">
             <a:avLst/>
@@ -1694,12 +1860,22 @@
             <a:round/>
           </a:ln>
         </p:spPr>
+        <p:style>
+          <a:lnRef idx="0"/>
+          <a:fillRef idx="0"/>
+          <a:effectRef idx="0"/>
+          <a:fontRef idx="minor"/>
+        </p:style>
         <p:txBody>
           <a:bodyPr lIns="95040" rIns="95040" tIns="50040" bIns="50040" anchor="t">
             <a:noAutofit/>
           </a:bodyPr>
           <a:p>
-            <a:pPr algn="ctr"/>
+            <a:pPr algn="ctr">
+              <a:lnSpc>
+                <a:spcPct val="100000"/>
+              </a:lnSpc>
+            </a:pPr>
             <a:r>
               <a:rPr b="1" lang="en-US" sz="1800" strike="noStrike" u="sng">
                 <a:solidFill>
@@ -1719,6 +1895,11 @@
             </a:endParaRPr>
           </a:p>
           <a:p>
+            <a:pPr>
+              <a:lnSpc>
+                <a:spcPct val="100000"/>
+              </a:lnSpc>
+            </a:pPr>
             <a:endParaRPr b="0" lang="en-US" sz="1800" strike="noStrike" u="none">
               <a:solidFill>
                 <a:srgbClr val="000000"/>
@@ -1728,6 +1909,11 @@
             </a:endParaRPr>
           </a:p>
           <a:p>
+            <a:pPr>
+              <a:lnSpc>
+                <a:spcPct val="100000"/>
+              </a:lnSpc>
+            </a:pPr>
             <a:r>
               <a:rPr b="0" lang="en-US" sz="1800" strike="noStrike" u="none">
                 <a:solidFill>
@@ -1747,6 +1933,11 @@
             </a:endParaRPr>
           </a:p>
           <a:p>
+            <a:pPr>
+              <a:lnSpc>
+                <a:spcPct val="100000"/>
+              </a:lnSpc>
+            </a:pPr>
             <a:r>
               <a:rPr b="0" lang="en-US" sz="1800" strike="noStrike" u="none">
                 <a:solidFill>
@@ -1766,6 +1957,11 @@
             </a:endParaRPr>
           </a:p>
           <a:p>
+            <a:pPr>
+              <a:lnSpc>
+                <a:spcPct val="100000"/>
+              </a:lnSpc>
+            </a:pPr>
             <a:endParaRPr b="0" lang="en-US" sz="1800" strike="noStrike" u="none">
               <a:solidFill>
                 <a:srgbClr val="000000"/>
@@ -1808,7 +2004,7 @@
       </p:grpSpPr>
       <p:sp>
         <p:nvSpPr>
-          <p:cNvPr id="36" name="PlaceHolder 1"/>
+          <p:cNvPr id="38" name="PlaceHolder 1"/>
           <p:cNvSpPr>
             <a:spLocks noGrp="1"/>
           </p:cNvSpPr>
@@ -1819,7 +2015,7 @@
         <p:spPr>
           <a:xfrm>
             <a:off x="504000" y="196560"/>
-            <a:ext cx="9070920" cy="945720"/>
+            <a:ext cx="9070560" cy="945360"/>
           </a:xfrm>
           <a:prstGeom prst="rect">
             <a:avLst/>
@@ -1865,7 +2061,7 @@
       </p:sp>
       <p:pic>
         <p:nvPicPr>
-          <p:cNvPr id="37" name="" descr=""/>
+          <p:cNvPr id="39" name="" descr=""/>
           <p:cNvPicPr/>
           <p:nvPr/>
         </p:nvPicPr>
@@ -1876,7 +2072,7 @@
         <p:spPr>
           <a:xfrm>
             <a:off x="2668320" y="1143000"/>
-            <a:ext cx="5103360" cy="3913200"/>
+            <a:ext cx="5103000" cy="3912840"/>
           </a:xfrm>
           <a:prstGeom prst="rect">
             <a:avLst/>
@@ -1918,7 +2114,7 @@
       </p:grpSpPr>
       <p:sp>
         <p:nvSpPr>
-          <p:cNvPr id="38" name="PlaceHolder 1"/>
+          <p:cNvPr id="40" name="PlaceHolder 1"/>
           <p:cNvSpPr>
             <a:spLocks noGrp="1"/>
           </p:cNvSpPr>
@@ -1929,7 +2125,7 @@
         <p:spPr>
           <a:xfrm>
             <a:off x="25920" y="349920"/>
-            <a:ext cx="4317120" cy="1249560"/>
+            <a:ext cx="4316760" cy="1249200"/>
           </a:xfrm>
           <a:prstGeom prst="rect">
             <a:avLst/>
@@ -1975,7 +2171,7 @@
       </p:sp>
       <p:pic>
         <p:nvPicPr>
-          <p:cNvPr id="39" name="" descr=""/>
+          <p:cNvPr id="41" name="" descr=""/>
           <p:cNvPicPr/>
           <p:nvPr/>
         </p:nvPicPr>
@@ -1987,7 +2183,7 @@
         <p:spPr>
           <a:xfrm>
             <a:off x="4343760" y="685800"/>
-            <a:ext cx="5256720" cy="4246200"/>
+            <a:ext cx="5256360" cy="4245840"/>
           </a:xfrm>
           <a:prstGeom prst="rect">
             <a:avLst/>
@@ -1999,14 +2195,14 @@
       </p:pic>
       <p:sp>
         <p:nvSpPr>
-          <p:cNvPr id="40" name=""/>
+          <p:cNvPr id="42" name=""/>
           <p:cNvSpPr/>
           <p:nvPr/>
         </p:nvSpPr>
         <p:spPr>
           <a:xfrm>
             <a:off x="228600" y="1867320"/>
-            <a:ext cx="3885480" cy="3161160"/>
+            <a:ext cx="3885120" cy="3160800"/>
           </a:xfrm>
           <a:prstGeom prst="rect">
             <a:avLst/>
@@ -2288,7 +2484,7 @@
       </p:grpSpPr>
       <p:sp>
         <p:nvSpPr>
-          <p:cNvPr id="41" name="PlaceHolder 1"/>
+          <p:cNvPr id="43" name="PlaceHolder 1"/>
           <p:cNvSpPr>
             <a:spLocks noGrp="1"/>
           </p:cNvSpPr>
@@ -2299,7 +2495,7 @@
         <p:spPr>
           <a:xfrm>
             <a:off x="504000" y="226080"/>
-            <a:ext cx="9070920" cy="945720"/>
+            <a:ext cx="9070560" cy="945360"/>
           </a:xfrm>
           <a:prstGeom prst="rect">
             <a:avLst/>
@@ -2345,7 +2541,7 @@
       </p:sp>
       <p:pic>
         <p:nvPicPr>
-          <p:cNvPr id="42" name="" descr=""/>
+          <p:cNvPr id="44" name="" descr=""/>
           <p:cNvPicPr/>
           <p:nvPr/>
         </p:nvPicPr>
@@ -2356,7 +2552,7 @@
         <p:spPr>
           <a:xfrm>
             <a:off x="2514600" y="1600200"/>
-            <a:ext cx="4951080" cy="3270960"/>
+            <a:ext cx="4950720" cy="3270600"/>
           </a:xfrm>
           <a:prstGeom prst="rect">
             <a:avLst/>
@@ -2398,7 +2594,7 @@
       </p:grpSpPr>
       <p:sp>
         <p:nvSpPr>
-          <p:cNvPr id="43" name="PlaceHolder 1"/>
+          <p:cNvPr id="45" name="PlaceHolder 1"/>
           <p:cNvSpPr>
             <a:spLocks noGrp="1"/>
           </p:cNvSpPr>
@@ -2409,7 +2605,7 @@
         <p:spPr>
           <a:xfrm>
             <a:off x="504000" y="226080"/>
-            <a:ext cx="9070920" cy="945720"/>
+            <a:ext cx="9070560" cy="945360"/>
           </a:xfrm>
           <a:prstGeom prst="rect">
             <a:avLst/>
@@ -2455,7 +2651,7 @@
       </p:sp>
       <p:pic>
         <p:nvPicPr>
-          <p:cNvPr id="44" name="" descr=""/>
+          <p:cNvPr id="46" name="" descr=""/>
           <p:cNvPicPr/>
           <p:nvPr/>
         </p:nvPicPr>
@@ -2466,7 +2662,7 @@
         <p:spPr>
           <a:xfrm>
             <a:off x="457200" y="1600200"/>
-            <a:ext cx="4017960" cy="3427200"/>
+            <a:ext cx="4017600" cy="3426840"/>
           </a:xfrm>
           <a:prstGeom prst="rect">
             <a:avLst/>
@@ -2478,7 +2674,7 @@
       </p:pic>
       <p:pic>
         <p:nvPicPr>
-          <p:cNvPr id="45" name="" descr=""/>
+          <p:cNvPr id="47" name="" descr=""/>
           <p:cNvPicPr/>
           <p:nvPr/>
         </p:nvPicPr>
@@ -2490,7 +2686,7 @@
         <p:spPr>
           <a:xfrm>
             <a:off x="5029200" y="2136600"/>
-            <a:ext cx="4571280" cy="2663280"/>
+            <a:ext cx="4570920" cy="2662920"/>
           </a:xfrm>
           <a:prstGeom prst="rect">
             <a:avLst/>
@@ -2502,14 +2698,14 @@
       </p:pic>
       <p:sp>
         <p:nvSpPr>
-          <p:cNvPr id="46" name=""/>
+          <p:cNvPr id="48" name=""/>
           <p:cNvSpPr/>
           <p:nvPr/>
         </p:nvSpPr>
         <p:spPr>
           <a:xfrm>
             <a:off x="5257800" y="1600200"/>
-            <a:ext cx="4342680" cy="456480"/>
+            <a:ext cx="4342320" cy="456120"/>
           </a:xfrm>
           <a:prstGeom prst="rect">
             <a:avLst/>
@@ -2546,7 +2742,7 @@
               </a:rPr>
               <a:t>Вывод программы</a:t>
             </a:r>
-            <a:endParaRPr b="1" lang="en-US" sz="1800" strike="noStrike" u="sng">
+            <a:endParaRPr b="0" lang="en-US" sz="1800" strike="noStrike" u="none">
               <a:solidFill>
                 <a:srgbClr val="000000"/>
               </a:solidFill>
@@ -2588,7 +2784,7 @@
       </p:grpSpPr>
       <p:sp>
         <p:nvSpPr>
-          <p:cNvPr id="47" name="PlaceHolder 1"/>
+          <p:cNvPr id="49" name="PlaceHolder 1"/>
           <p:cNvSpPr>
             <a:spLocks noGrp="1"/>
           </p:cNvSpPr>
@@ -2599,7 +2795,7 @@
         <p:spPr>
           <a:xfrm>
             <a:off x="457200" y="197280"/>
-            <a:ext cx="9070920" cy="945720"/>
+            <a:ext cx="9070560" cy="945360"/>
           </a:xfrm>
           <a:prstGeom prst="rect">
             <a:avLst/>
@@ -2615,7 +2811,13 @@
           </a:bodyPr>
           <a:p>
             <a:pPr indent="0" algn="ctr">
+              <a:lnSpc>
+                <a:spcPct val="100000"/>
+              </a:lnSpc>
               <a:buNone/>
+              <a:tabLst>
+                <a:tab algn="l" pos="0"/>
+              </a:tabLst>
             </a:pPr>
             <a:r>
               <a:rPr b="0" lang="en-US" sz="4400" strike="noStrike" u="none">
@@ -2639,14 +2841,14 @@
       </p:sp>
       <p:sp>
         <p:nvSpPr>
-          <p:cNvPr id="48" name=""/>
-          <p:cNvSpPr txBox="1"/>
+          <p:cNvPr id="50" name=""/>
+          <p:cNvSpPr/>
           <p:nvPr/>
         </p:nvSpPr>
         <p:spPr>
           <a:xfrm>
             <a:off x="914400" y="1600200"/>
-            <a:ext cx="8229600" cy="3200400"/>
+            <a:ext cx="8229240" cy="3200040"/>
           </a:xfrm>
           <a:prstGeom prst="rect">
             <a:avLst/>
@@ -2656,13 +2858,24 @@
             <a:noFill/>
           </a:ln>
         </p:spPr>
+        <p:style>
+          <a:lnRef idx="0"/>
+          <a:fillRef idx="0"/>
+          <a:effectRef idx="0"/>
+          <a:fontRef idx="minor"/>
+        </p:style>
         <p:txBody>
           <a:bodyPr lIns="90000" rIns="90000" tIns="45000" bIns="45000" anchor="t">
             <a:noAutofit/>
           </a:bodyPr>
           <a:p>
-            <a:r>
-              <a:rPr b="0" lang="en-US" sz="1800" strike="noStrike" u="none">
+            <a:pPr>
+              <a:lnSpc>
+                <a:spcPct val="100000"/>
+              </a:lnSpc>
+            </a:pPr>
+            <a:r>
+              <a:rPr b="0" lang="en-US" sz="2000" strike="noStrike" u="none">
                 <a:solidFill>
                   <a:srgbClr val="000000"/>
                 </a:solidFill>
@@ -2671,7 +2884,7 @@
               </a:rPr>
               <a:t>Что осталось за бортом?</a:t>
             </a:r>
-            <a:endParaRPr b="0" lang="en-US" sz="1800" strike="noStrike" u="none">
+            <a:endParaRPr b="0" lang="en-US" sz="2000" strike="noStrike" u="none">
               <a:solidFill>
                 <a:srgbClr val="000000"/>
               </a:solidFill>
@@ -2681,6 +2894,9 @@
           </a:p>
           <a:p>
             <a:pPr marL="216000" indent="-216000">
+              <a:lnSpc>
+                <a:spcPct val="100000"/>
+              </a:lnSpc>
               <a:buClr>
                 <a:srgbClr val="000000"/>
               </a:buClr>
@@ -2689,7 +2905,7 @@
               <a:buChar char=""/>
             </a:pPr>
             <a:r>
-              <a:rPr b="0" lang="en-US" sz="1800" strike="noStrike" u="none">
+              <a:rPr b="0" lang="en-US" sz="2000" strike="noStrike" u="none">
                 <a:solidFill>
                   <a:srgbClr val="000000"/>
                 </a:solidFill>
@@ -2698,7 +2914,7 @@
               </a:rPr>
               <a:t>@property (очень удобный декоратор)</a:t>
             </a:r>
-            <a:endParaRPr b="0" lang="en-US" sz="1800" strike="noStrike" u="none">
+            <a:endParaRPr b="0" lang="en-US" sz="2000" strike="noStrike" u="none">
               <a:solidFill>
                 <a:srgbClr val="000000"/>
               </a:solidFill>
@@ -2708,6 +2924,9 @@
           </a:p>
           <a:p>
             <a:pPr marL="216000" indent="-216000">
+              <a:lnSpc>
+                <a:spcPct val="100000"/>
+              </a:lnSpc>
               <a:buClr>
                 <a:srgbClr val="000000"/>
               </a:buClr>
@@ -2716,16 +2935,16 @@
               <a:buChar char=""/>
             </a:pPr>
             <a:r>
-              <a:rPr b="0" lang="en-US" sz="1800" strike="noStrike" u="none">
-                <a:solidFill>
-                  <a:srgbClr val="000000"/>
-                </a:solidFill>
-                <a:uFillTx/>
-                <a:latin typeface="Arial"/>
-              </a:rPr>
-              <a:t>Алгоритм порядка вызова методов при множественном наследовании (Method Resolution Order) — есть статья на хабре</a:t>
-            </a:r>
-            <a:endParaRPr b="0" lang="en-US" sz="1800" strike="noStrike" u="none">
+              <a:rPr b="0" lang="en-US" sz="2000" strike="noStrike" u="none">
+                <a:solidFill>
+                  <a:srgbClr val="000000"/>
+                </a:solidFill>
+                <a:uFillTx/>
+                <a:latin typeface="Arial"/>
+              </a:rPr>
+              <a:t>Алгоритм порядка вызова методов при множественном наследовании (Method Resolution Order)</a:t>
+            </a:r>
+            <a:endParaRPr b="0" lang="en-US" sz="2000" strike="noStrike" u="none">
               <a:solidFill>
                 <a:srgbClr val="000000"/>
               </a:solidFill>
@@ -2735,6 +2954,9 @@
           </a:p>
           <a:p>
             <a:pPr marL="216000" indent="-216000">
+              <a:lnSpc>
+                <a:spcPct val="100000"/>
+              </a:lnSpc>
               <a:buClr>
                 <a:srgbClr val="000000"/>
               </a:buClr>
@@ -2743,16 +2965,26 @@
               <a:buChar char=""/>
             </a:pPr>
             <a:r>
-              <a:rPr b="0" lang="en-US" sz="1800" strike="noStrike" u="none">
-                <a:solidFill>
-                  <a:srgbClr val="000000"/>
-                </a:solidFill>
-                <a:uFillTx/>
-                <a:latin typeface="Arial"/>
-              </a:rPr>
-              <a:t>Деструкторы в Python (__del__</a:t>
-            </a:r>
-            <a:endParaRPr b="0" lang="en-US" sz="1800" strike="noStrike" u="none">
+              <a:rPr b="0" lang="en-US" sz="2000" strike="noStrike" u="none">
+                <a:solidFill>
+                  <a:srgbClr val="000000"/>
+                </a:solidFill>
+                <a:uFillTx/>
+                <a:latin typeface="Arial"/>
+              </a:rPr>
+              <a:t>На самом деле </a:t>
+            </a:r>
+            <a:r>
+              <a:rPr b="1" lang="en-US" sz="2000" strike="noStrike" u="none">
+                <a:solidFill>
+                  <a:srgbClr val="000000"/>
+                </a:solidFill>
+                <a:uFillTx/>
+                <a:latin typeface="Arial"/>
+              </a:rPr>
+              <a:t>super() — это не вызов родительского класса!</a:t>
+            </a:r>
+            <a:endParaRPr b="0" lang="en-US" sz="2000" strike="noStrike" u="none">
               <a:solidFill>
                 <a:srgbClr val="000000"/>
               </a:solidFill>
@@ -2762,6 +2994,9 @@
           </a:p>
           <a:p>
             <a:pPr marL="216000" indent="-216000">
+              <a:lnSpc>
+                <a:spcPct val="100000"/>
+              </a:lnSpc>
               <a:buClr>
                 <a:srgbClr val="000000"/>
               </a:buClr>
@@ -2770,16 +3005,16 @@
               <a:buChar char=""/>
             </a:pPr>
             <a:r>
-              <a:rPr b="0" lang="en-US" sz="1800" strike="noStrike" u="none">
-                <a:solidFill>
-                  <a:srgbClr val="000000"/>
-                </a:solidFill>
-                <a:uFillTx/>
-                <a:latin typeface="Arial"/>
-              </a:rPr>
-              <a:t>Перегрузка операторов (__str__, __add__ и прочие)</a:t>
-            </a:r>
-            <a:endParaRPr b="0" lang="en-US" sz="1800" strike="noStrike" u="none">
+              <a:rPr b="0" lang="en-US" sz="2000" strike="noStrike" u="none">
+                <a:solidFill>
+                  <a:srgbClr val="000000"/>
+                </a:solidFill>
+                <a:uFillTx/>
+                <a:latin typeface="Arial"/>
+              </a:rPr>
+              <a:t>Деструкторы в Python (__del__)</a:t>
+            </a:r>
+            <a:endParaRPr b="0" lang="en-US" sz="2000" strike="noStrike" u="none">
               <a:solidFill>
                 <a:srgbClr val="000000"/>
               </a:solidFill>
@@ -2789,6 +3024,9 @@
           </a:p>
           <a:p>
             <a:pPr marL="216000" indent="-216000">
+              <a:lnSpc>
+                <a:spcPct val="100000"/>
+              </a:lnSpc>
               <a:buClr>
                 <a:srgbClr val="000000"/>
               </a:buClr>
@@ -2797,16 +3035,16 @@
               <a:buChar char=""/>
             </a:pPr>
             <a:r>
-              <a:rPr b="0" lang="en-US" sz="1800" strike="noStrike" u="none">
-                <a:solidFill>
-                  <a:srgbClr val="000000"/>
-                </a:solidFill>
-                <a:uFillTx/>
-                <a:latin typeface="Arial"/>
-              </a:rPr>
-              <a:t>Вложенные классы</a:t>
-            </a:r>
-            <a:endParaRPr b="0" lang="en-US" sz="1800" strike="noStrike" u="none">
+              <a:rPr b="0" lang="en-US" sz="2000" strike="noStrike" u="none">
+                <a:solidFill>
+                  <a:srgbClr val="000000"/>
+                </a:solidFill>
+                <a:uFillTx/>
+                <a:latin typeface="Arial"/>
+              </a:rPr>
+              <a:t>Перегрузка операторов (__str__, __add__ и прочие)</a:t>
+            </a:r>
+            <a:endParaRPr b="0" lang="en-US" sz="2000" strike="noStrike" u="none">
               <a:solidFill>
                 <a:srgbClr val="000000"/>
               </a:solidFill>
@@ -2816,6 +3054,9 @@
           </a:p>
           <a:p>
             <a:pPr marL="216000" indent="-216000">
+              <a:lnSpc>
+                <a:spcPct val="100000"/>
+              </a:lnSpc>
               <a:buClr>
                 <a:srgbClr val="000000"/>
               </a:buClr>
@@ -2824,7 +3065,37 @@
               <a:buChar char=""/>
             </a:pPr>
             <a:r>
-              <a:rPr b="0" lang="en-US" sz="1800" strike="noStrike" u="none">
+              <a:rPr b="0" lang="en-US" sz="2000" strike="noStrike" u="none">
+                <a:solidFill>
+                  <a:srgbClr val="000000"/>
+                </a:solidFill>
+                <a:uFillTx/>
+                <a:latin typeface="Arial"/>
+              </a:rPr>
+              <a:t>Вложенные классы</a:t>
+            </a:r>
+            <a:endParaRPr b="0" lang="en-US" sz="2000" strike="noStrike" u="none">
+              <a:solidFill>
+                <a:srgbClr val="000000"/>
+              </a:solidFill>
+              <a:uFillTx/>
+              <a:latin typeface="Arial"/>
+            </a:endParaRPr>
+          </a:p>
+          <a:p>
+            <a:pPr marL="216000" indent="-216000">
+              <a:lnSpc>
+                <a:spcPct val="100000"/>
+              </a:lnSpc>
+              <a:buClr>
+                <a:srgbClr val="000000"/>
+              </a:buClr>
+              <a:buSzPct val="45000"/>
+              <a:buFont typeface="Wingdings" charset="2"/>
+              <a:buChar char=""/>
+            </a:pPr>
+            <a:r>
+              <a:rPr b="0" lang="en-US" sz="2000" strike="noStrike" u="none">
                 <a:solidFill>
                   <a:srgbClr val="000000"/>
                 </a:solidFill>
@@ -2833,7 +3104,7 @@
               </a:rPr>
               <a:t>...</a:t>
             </a:r>
-            <a:endParaRPr b="0" lang="en-US" sz="1800" strike="noStrike" u="none">
+            <a:endParaRPr b="0" lang="en-US" sz="2000" strike="noStrike" u="none">
               <a:solidFill>
                 <a:srgbClr val="000000"/>
               </a:solidFill>
@@ -2875,7 +3146,7 @@
       </p:grpSpPr>
       <p:pic>
         <p:nvPicPr>
-          <p:cNvPr id="49" name="" descr=""/>
+          <p:cNvPr id="51" name="" descr=""/>
           <p:cNvPicPr/>
           <p:nvPr/>
         </p:nvPicPr>
@@ -2886,7 +3157,7 @@
         <p:spPr>
           <a:xfrm>
             <a:off x="2971800" y="1371600"/>
-            <a:ext cx="4114080" cy="4114080"/>
+            <a:ext cx="4113720" cy="4113720"/>
           </a:xfrm>
           <a:prstGeom prst="rect">
             <a:avLst/>
@@ -2898,7 +3169,7 @@
       </p:pic>
       <p:sp>
         <p:nvSpPr>
-          <p:cNvPr id="50" name="PlaceHolder 1"/>
+          <p:cNvPr id="52" name="PlaceHolder 1"/>
           <p:cNvSpPr>
             <a:spLocks noGrp="1"/>
           </p:cNvSpPr>
@@ -2909,7 +3180,7 @@
         <p:spPr>
           <a:xfrm>
             <a:off x="529560" y="228600"/>
-            <a:ext cx="9070920" cy="945720"/>
+            <a:ext cx="9070560" cy="945360"/>
           </a:xfrm>
           <a:prstGeom prst="rect">
             <a:avLst/>
@@ -2985,7 +3256,7 @@
       </p:grpSpPr>
       <p:sp>
         <p:nvSpPr>
-          <p:cNvPr id="15" name="PlaceHolder 1"/>
+          <p:cNvPr id="17" name="PlaceHolder 1"/>
           <p:cNvSpPr>
             <a:spLocks noGrp="1"/>
           </p:cNvSpPr>
@@ -2996,7 +3267,7 @@
         <p:spPr>
           <a:xfrm>
             <a:off x="504000" y="226080"/>
-            <a:ext cx="9070920" cy="945720"/>
+            <a:ext cx="9070560" cy="945360"/>
           </a:xfrm>
           <a:prstGeom prst="rect">
             <a:avLst/>
@@ -3042,7 +3313,7 @@
       </p:sp>
       <p:pic>
         <p:nvPicPr>
-          <p:cNvPr id="16" name="" descr=""/>
+          <p:cNvPr id="18" name="" descr=""/>
           <p:cNvPicPr/>
           <p:nvPr/>
         </p:nvPicPr>
@@ -3053,7 +3324,7 @@
         <p:spPr>
           <a:xfrm>
             <a:off x="1055520" y="1371600"/>
-            <a:ext cx="8087760" cy="3027240"/>
+            <a:ext cx="8087400" cy="3026880"/>
           </a:xfrm>
           <a:prstGeom prst="rect">
             <a:avLst/>
@@ -3095,7 +3366,7 @@
       </p:grpSpPr>
       <p:sp>
         <p:nvSpPr>
-          <p:cNvPr id="17" name="PlaceHolder 1"/>
+          <p:cNvPr id="19" name="PlaceHolder 1"/>
           <p:cNvSpPr>
             <a:spLocks noGrp="1"/>
           </p:cNvSpPr>
@@ -3106,7 +3377,7 @@
         <p:spPr>
           <a:xfrm>
             <a:off x="504000" y="226080"/>
-            <a:ext cx="9070920" cy="945720"/>
+            <a:ext cx="9070560" cy="945360"/>
           </a:xfrm>
           <a:prstGeom prst="rect">
             <a:avLst/>
@@ -3152,7 +3423,7 @@
       </p:sp>
       <p:pic>
         <p:nvPicPr>
-          <p:cNvPr id="18" name="" descr=""/>
+          <p:cNvPr id="20" name="" descr=""/>
           <p:cNvPicPr/>
           <p:nvPr/>
         </p:nvPicPr>
@@ -3163,7 +3434,7 @@
         <p:spPr>
           <a:xfrm>
             <a:off x="2057400" y="1371600"/>
-            <a:ext cx="5942880" cy="3600720"/>
+            <a:ext cx="5942520" cy="3600360"/>
           </a:xfrm>
           <a:prstGeom prst="rect">
             <a:avLst/>
@@ -3205,7 +3476,7 @@
       </p:grpSpPr>
       <p:sp>
         <p:nvSpPr>
-          <p:cNvPr id="19" name="PlaceHolder 1"/>
+          <p:cNvPr id="21" name="PlaceHolder 1"/>
           <p:cNvSpPr>
             <a:spLocks noGrp="1"/>
           </p:cNvSpPr>
@@ -3216,7 +3487,7 @@
         <p:spPr>
           <a:xfrm>
             <a:off x="6400800" y="867960"/>
-            <a:ext cx="3307680" cy="1874520"/>
+            <a:ext cx="3307320" cy="1874160"/>
           </a:xfrm>
           <a:prstGeom prst="rect">
             <a:avLst/>
@@ -3262,7 +3533,7 @@
       </p:sp>
       <p:pic>
         <p:nvPicPr>
-          <p:cNvPr id="20" name="" descr=""/>
+          <p:cNvPr id="22" name="" descr=""/>
           <p:cNvPicPr/>
           <p:nvPr/>
         </p:nvPicPr>
@@ -3274,7 +3545,7 @@
         <p:spPr>
           <a:xfrm>
             <a:off x="228600" y="276480"/>
-            <a:ext cx="6292080" cy="5209200"/>
+            <a:ext cx="6291720" cy="5208840"/>
           </a:xfrm>
           <a:prstGeom prst="rect">
             <a:avLst/>
@@ -3286,14 +3557,14 @@
       </p:pic>
       <p:sp>
         <p:nvSpPr>
-          <p:cNvPr id="21" name=""/>
+          <p:cNvPr id="23" name=""/>
           <p:cNvSpPr/>
           <p:nvPr/>
         </p:nvSpPr>
         <p:spPr>
           <a:xfrm>
             <a:off x="6858000" y="3200400"/>
-            <a:ext cx="2513880" cy="1625400"/>
+            <a:ext cx="2513520" cy="1625040"/>
           </a:xfrm>
           <a:prstGeom prst="rect">
             <a:avLst/>
@@ -3397,7 +3668,7 @@
       </p:grpSpPr>
       <p:sp>
         <p:nvSpPr>
-          <p:cNvPr id="22" name="PlaceHolder 1"/>
+          <p:cNvPr id="24" name="PlaceHolder 1"/>
           <p:cNvSpPr>
             <a:spLocks noGrp="1"/>
           </p:cNvSpPr>
@@ -3408,7 +3679,7 @@
         <p:spPr>
           <a:xfrm>
             <a:off x="457200" y="2178720"/>
-            <a:ext cx="3199680" cy="1249560"/>
+            <a:ext cx="3199320" cy="1249200"/>
           </a:xfrm>
           <a:prstGeom prst="rect">
             <a:avLst/>
@@ -3467,7 +3738,7 @@
       </p:sp>
       <p:pic>
         <p:nvPicPr>
-          <p:cNvPr id="23" name="" descr=""/>
+          <p:cNvPr id="25" name="" descr=""/>
           <p:cNvPicPr/>
           <p:nvPr/>
         </p:nvPicPr>
@@ -3478,7 +3749,7 @@
         <p:spPr>
           <a:xfrm>
             <a:off x="4343400" y="457200"/>
-            <a:ext cx="4955040" cy="4799880"/>
+            <a:ext cx="4954680" cy="4799520"/>
           </a:xfrm>
           <a:prstGeom prst="rect">
             <a:avLst/>
@@ -3520,7 +3791,7 @@
       </p:grpSpPr>
       <p:sp>
         <p:nvSpPr>
-          <p:cNvPr id="24" name="PlaceHolder 1"/>
+          <p:cNvPr id="26" name="PlaceHolder 1"/>
           <p:cNvSpPr>
             <a:spLocks noGrp="1"/>
           </p:cNvSpPr>
@@ -3531,7 +3802,7 @@
         <p:spPr>
           <a:xfrm>
             <a:off x="504000" y="226080"/>
-            <a:ext cx="9070920" cy="945720"/>
+            <a:ext cx="9070560" cy="945360"/>
           </a:xfrm>
           <a:prstGeom prst="rect">
             <a:avLst/>
@@ -3577,7 +3848,7 @@
       </p:sp>
       <p:pic>
         <p:nvPicPr>
-          <p:cNvPr id="25" name="" descr=""/>
+          <p:cNvPr id="27" name="" descr=""/>
           <p:cNvPicPr/>
           <p:nvPr/>
         </p:nvPicPr>
@@ -3588,7 +3859,7 @@
         <p:spPr>
           <a:xfrm>
             <a:off x="1371600" y="1515600"/>
-            <a:ext cx="7494120" cy="3284280"/>
+            <a:ext cx="7493760" cy="3283920"/>
           </a:xfrm>
           <a:prstGeom prst="rect">
             <a:avLst/>
@@ -3630,7 +3901,7 @@
       </p:grpSpPr>
       <p:sp>
         <p:nvSpPr>
-          <p:cNvPr id="26" name="PlaceHolder 1"/>
+          <p:cNvPr id="28" name="PlaceHolder 1"/>
           <p:cNvSpPr>
             <a:spLocks noGrp="1"/>
           </p:cNvSpPr>
@@ -3641,7 +3912,7 @@
         <p:spPr>
           <a:xfrm>
             <a:off x="5486400" y="2286000"/>
-            <a:ext cx="4342680" cy="945720"/>
+            <a:ext cx="4342320" cy="945360"/>
           </a:xfrm>
           <a:prstGeom prst="rect">
             <a:avLst/>
@@ -3687,7 +3958,7 @@
       </p:sp>
       <p:pic>
         <p:nvPicPr>
-          <p:cNvPr id="27" name="" descr=""/>
+          <p:cNvPr id="29" name="" descr=""/>
           <p:cNvPicPr/>
           <p:nvPr/>
         </p:nvPicPr>
@@ -3698,7 +3969,7 @@
         <p:spPr>
           <a:xfrm>
             <a:off x="457200" y="457200"/>
-            <a:ext cx="5028480" cy="4979520"/>
+            <a:ext cx="5028120" cy="4979160"/>
           </a:xfrm>
           <a:prstGeom prst="rect">
             <a:avLst/>
@@ -3740,7 +4011,7 @@
       </p:grpSpPr>
       <p:sp>
         <p:nvSpPr>
-          <p:cNvPr id="28" name="PlaceHolder 1"/>
+          <p:cNvPr id="30" name="PlaceHolder 1"/>
           <p:cNvSpPr>
             <a:spLocks noGrp="1"/>
           </p:cNvSpPr>
@@ -3751,7 +4022,7 @@
         <p:spPr>
           <a:xfrm>
             <a:off x="504000" y="226080"/>
-            <a:ext cx="9070920" cy="945720"/>
+            <a:ext cx="9070560" cy="945360"/>
           </a:xfrm>
           <a:prstGeom prst="rect">
             <a:avLst/>
@@ -3797,7 +4068,7 @@
       </p:sp>
       <p:pic>
         <p:nvPicPr>
-          <p:cNvPr id="29" name="" descr=""/>
+          <p:cNvPr id="31" name="" descr=""/>
           <p:cNvPicPr/>
           <p:nvPr/>
         </p:nvPicPr>
@@ -3808,7 +4079,7 @@
         <p:spPr>
           <a:xfrm>
             <a:off x="1782720" y="1134360"/>
-            <a:ext cx="6674760" cy="4122720"/>
+            <a:ext cx="6674400" cy="4122360"/>
           </a:xfrm>
           <a:prstGeom prst="rect">
             <a:avLst/>
@@ -3850,7 +4121,7 @@
       </p:grpSpPr>
       <p:sp>
         <p:nvSpPr>
-          <p:cNvPr id="30" name="PlaceHolder 1"/>
+          <p:cNvPr id="32" name="PlaceHolder 1"/>
           <p:cNvSpPr>
             <a:spLocks noGrp="1"/>
           </p:cNvSpPr>
@@ -3861,7 +4132,7 @@
         <p:spPr>
           <a:xfrm>
             <a:off x="504000" y="74160"/>
-            <a:ext cx="9070920" cy="1249920"/>
+            <a:ext cx="9070560" cy="1249560"/>
           </a:xfrm>
           <a:prstGeom prst="rect">
             <a:avLst/>
@@ -3907,7 +4178,7 @@
       </p:sp>
       <p:pic>
         <p:nvPicPr>
-          <p:cNvPr id="31" name="" descr=""/>
+          <p:cNvPr id="33" name="" descr=""/>
           <p:cNvPicPr/>
           <p:nvPr/>
         </p:nvPicPr>
@@ -3918,7 +4189,7 @@
         <p:spPr>
           <a:xfrm>
             <a:off x="420120" y="1389240"/>
-            <a:ext cx="4917960" cy="3639960"/>
+            <a:ext cx="4917600" cy="3639600"/>
           </a:xfrm>
           <a:prstGeom prst="rect">
             <a:avLst/>
@@ -3930,14 +4201,14 @@
       </p:pic>
       <p:sp>
         <p:nvSpPr>
-          <p:cNvPr id="32" name=""/>
-          <p:cNvSpPr txBox="1"/>
+          <p:cNvPr id="34" name=""/>
+          <p:cNvSpPr/>
           <p:nvPr/>
         </p:nvSpPr>
         <p:spPr>
           <a:xfrm>
             <a:off x="6400800" y="2514600"/>
-            <a:ext cx="3429000" cy="1645920"/>
+            <a:ext cx="3428640" cy="1645560"/>
           </a:xfrm>
           <a:prstGeom prst="rect">
             <a:avLst/>
@@ -3950,12 +4221,22 @@
             <a:round/>
           </a:ln>
         </p:spPr>
+        <p:style>
+          <a:lnRef idx="0"/>
+          <a:fillRef idx="0"/>
+          <a:effectRef idx="0"/>
+          <a:fontRef idx="minor"/>
+        </p:style>
         <p:txBody>
           <a:bodyPr lIns="95040" rIns="95040" tIns="50040" bIns="50040" anchor="t">
             <a:noAutofit/>
           </a:bodyPr>
           <a:p>
-            <a:pPr algn="ctr"/>
+            <a:pPr algn="ctr">
+              <a:lnSpc>
+                <a:spcPct val="100000"/>
+              </a:lnSpc>
+            </a:pPr>
             <a:r>
               <a:rPr b="1" lang="en-US" sz="1800" strike="noStrike" u="sng">
                 <a:solidFill>
@@ -3975,6 +4256,11 @@
             </a:endParaRPr>
           </a:p>
           <a:p>
+            <a:pPr>
+              <a:lnSpc>
+                <a:spcPct val="100000"/>
+              </a:lnSpc>
+            </a:pPr>
             <a:endParaRPr b="0" lang="en-US" sz="1800" strike="noStrike" u="none">
               <a:solidFill>
                 <a:srgbClr val="000000"/>
@@ -3984,6 +4270,11 @@
             </a:endParaRPr>
           </a:p>
           <a:p>
+            <a:pPr>
+              <a:lnSpc>
+                <a:spcPct val="100000"/>
+              </a:lnSpc>
+            </a:pPr>
             <a:r>
               <a:rPr b="0" lang="en-US" sz="1800" strike="noStrike" u="none">
                 <a:solidFill>
@@ -4003,6 +4294,11 @@
             </a:endParaRPr>
           </a:p>
           <a:p>
+            <a:pPr>
+              <a:lnSpc>
+                <a:spcPct val="100000"/>
+              </a:lnSpc>
+            </a:pPr>
             <a:r>
               <a:rPr b="0" lang="en-US" sz="1800" strike="noStrike" u="none">
                 <a:solidFill>
@@ -4022,6 +4318,11 @@
             </a:endParaRPr>
           </a:p>
           <a:p>
+            <a:pPr>
+              <a:lnSpc>
+                <a:spcPct val="100000"/>
+              </a:lnSpc>
+            </a:pPr>
             <a:endParaRPr b="0" lang="en-US" sz="1800" strike="noStrike" u="none">
               <a:solidFill>
                 <a:srgbClr val="000000"/>
@@ -4031,6 +4332,11 @@
             </a:endParaRPr>
           </a:p>
           <a:p>
+            <a:pPr>
+              <a:lnSpc>
+                <a:spcPct val="100000"/>
+              </a:lnSpc>
+            </a:pPr>
             <a:endParaRPr b="0" lang="en-US" sz="1800" strike="noStrike" u="none">
               <a:solidFill>
                 <a:srgbClr val="000000"/>

</xml_diff>